<commit_message>
kant sources articles and derrangement
</commit_message>
<xml_diff>
--- a/assets uarm/2023 1 UarmPCrit/Kant - Doctrina del Derecho.pptx
+++ b/assets uarm/2023 1 UarmPCrit/Kant - Doctrina del Derecho.pptx
@@ -290,7 +290,7 @@
           <a:p>
             <a:fld id="{E66BC72F-45A4-4885-98CF-CAA0E404D566}" type="datetimeFigureOut">
               <a:rPr lang="es-PE" smtClean="0"/>
-              <a:t>6/07/2023</a:t>
+              <a:t>2/11/2023</a:t>
             </a:fld>
             <a:endParaRPr lang="es-PE"/>
           </a:p>
@@ -460,7 +460,7 @@
           <a:p>
             <a:fld id="{E66BC72F-45A4-4885-98CF-CAA0E404D566}" type="datetimeFigureOut">
               <a:rPr lang="es-PE" smtClean="0"/>
-              <a:t>6/07/2023</a:t>
+              <a:t>2/11/2023</a:t>
             </a:fld>
             <a:endParaRPr lang="es-PE"/>
           </a:p>
@@ -640,7 +640,7 @@
           <a:p>
             <a:fld id="{E66BC72F-45A4-4885-98CF-CAA0E404D566}" type="datetimeFigureOut">
               <a:rPr lang="es-PE" smtClean="0"/>
-              <a:t>6/07/2023</a:t>
+              <a:t>2/11/2023</a:t>
             </a:fld>
             <a:endParaRPr lang="es-PE"/>
           </a:p>
@@ -810,7 +810,7 @@
           <a:p>
             <a:fld id="{E66BC72F-45A4-4885-98CF-CAA0E404D566}" type="datetimeFigureOut">
               <a:rPr lang="es-PE" smtClean="0"/>
-              <a:t>6/07/2023</a:t>
+              <a:t>2/11/2023</a:t>
             </a:fld>
             <a:endParaRPr lang="es-PE"/>
           </a:p>
@@ -1056,7 +1056,7 @@
           <a:p>
             <a:fld id="{E66BC72F-45A4-4885-98CF-CAA0E404D566}" type="datetimeFigureOut">
               <a:rPr lang="es-PE" smtClean="0"/>
-              <a:t>6/07/2023</a:t>
+              <a:t>2/11/2023</a:t>
             </a:fld>
             <a:endParaRPr lang="es-PE"/>
           </a:p>
@@ -1288,7 +1288,7 @@
           <a:p>
             <a:fld id="{E66BC72F-45A4-4885-98CF-CAA0E404D566}" type="datetimeFigureOut">
               <a:rPr lang="es-PE" smtClean="0"/>
-              <a:t>6/07/2023</a:t>
+              <a:t>2/11/2023</a:t>
             </a:fld>
             <a:endParaRPr lang="es-PE"/>
           </a:p>
@@ -1655,7 +1655,7 @@
           <a:p>
             <a:fld id="{E66BC72F-45A4-4885-98CF-CAA0E404D566}" type="datetimeFigureOut">
               <a:rPr lang="es-PE" smtClean="0"/>
-              <a:t>6/07/2023</a:t>
+              <a:t>2/11/2023</a:t>
             </a:fld>
             <a:endParaRPr lang="es-PE"/>
           </a:p>
@@ -1773,7 +1773,7 @@
           <a:p>
             <a:fld id="{E66BC72F-45A4-4885-98CF-CAA0E404D566}" type="datetimeFigureOut">
               <a:rPr lang="es-PE" smtClean="0"/>
-              <a:t>6/07/2023</a:t>
+              <a:t>2/11/2023</a:t>
             </a:fld>
             <a:endParaRPr lang="es-PE"/>
           </a:p>
@@ -1868,7 +1868,7 @@
           <a:p>
             <a:fld id="{E66BC72F-45A4-4885-98CF-CAA0E404D566}" type="datetimeFigureOut">
               <a:rPr lang="es-PE" smtClean="0"/>
-              <a:t>6/07/2023</a:t>
+              <a:t>2/11/2023</a:t>
             </a:fld>
             <a:endParaRPr lang="es-PE"/>
           </a:p>
@@ -2145,7 +2145,7 @@
           <a:p>
             <a:fld id="{E66BC72F-45A4-4885-98CF-CAA0E404D566}" type="datetimeFigureOut">
               <a:rPr lang="es-PE" smtClean="0"/>
-              <a:t>6/07/2023</a:t>
+              <a:t>2/11/2023</a:t>
             </a:fld>
             <a:endParaRPr lang="es-PE"/>
           </a:p>
@@ -2398,7 +2398,7 @@
           <a:p>
             <a:fld id="{E66BC72F-45A4-4885-98CF-CAA0E404D566}" type="datetimeFigureOut">
               <a:rPr lang="es-PE" smtClean="0"/>
-              <a:t>6/07/2023</a:t>
+              <a:t>2/11/2023</a:t>
             </a:fld>
             <a:endParaRPr lang="es-PE"/>
           </a:p>
@@ -2611,7 +2611,7 @@
           <a:p>
             <a:fld id="{E66BC72F-45A4-4885-98CF-CAA0E404D566}" type="datetimeFigureOut">
               <a:rPr lang="es-PE" smtClean="0"/>
-              <a:t>6/07/2023</a:t>
+              <a:t>2/11/2023</a:t>
             </a:fld>
             <a:endParaRPr lang="es-PE"/>
           </a:p>

</xml_diff>